<commit_message>
Added read me file
Plus some linebreaks and more detailed kcal/g in the stand alone calorie
Conversion file
</commit_message>
<xml_diff>
--- a/readme.pptx
+++ b/readme.pptx
@@ -250,7 +250,7 @@
           <a:p>
             <a:fld id="{7687D076-075A-4CBA-87EE-CF54B5B44D0B}" type="datetimeFigureOut">
               <a:rPr lang="en-US" smtClean="0"/>
-              <a:t>12/14/2016</a:t>
+              <a:t>1/31/2017</a:t>
             </a:fld>
             <a:endParaRPr lang="en-US"/>
           </a:p>
@@ -420,7 +420,7 @@
           <a:p>
             <a:fld id="{7687D076-075A-4CBA-87EE-CF54B5B44D0B}" type="datetimeFigureOut">
               <a:rPr lang="en-US" smtClean="0"/>
-              <a:t>12/14/2016</a:t>
+              <a:t>1/31/2017</a:t>
             </a:fld>
             <a:endParaRPr lang="en-US"/>
           </a:p>
@@ -600,7 +600,7 @@
           <a:p>
             <a:fld id="{7687D076-075A-4CBA-87EE-CF54B5B44D0B}" type="datetimeFigureOut">
               <a:rPr lang="en-US" smtClean="0"/>
-              <a:t>12/14/2016</a:t>
+              <a:t>1/31/2017</a:t>
             </a:fld>
             <a:endParaRPr lang="en-US"/>
           </a:p>
@@ -770,7 +770,7 @@
           <a:p>
             <a:fld id="{7687D076-075A-4CBA-87EE-CF54B5B44D0B}" type="datetimeFigureOut">
               <a:rPr lang="en-US" smtClean="0"/>
-              <a:t>12/14/2016</a:t>
+              <a:t>1/31/2017</a:t>
             </a:fld>
             <a:endParaRPr lang="en-US"/>
           </a:p>
@@ -1016,7 +1016,7 @@
           <a:p>
             <a:fld id="{7687D076-075A-4CBA-87EE-CF54B5B44D0B}" type="datetimeFigureOut">
               <a:rPr lang="en-US" smtClean="0"/>
-              <a:t>12/14/2016</a:t>
+              <a:t>1/31/2017</a:t>
             </a:fld>
             <a:endParaRPr lang="en-US"/>
           </a:p>
@@ -1248,7 +1248,7 @@
           <a:p>
             <a:fld id="{7687D076-075A-4CBA-87EE-CF54B5B44D0B}" type="datetimeFigureOut">
               <a:rPr lang="en-US" smtClean="0"/>
-              <a:t>12/14/2016</a:t>
+              <a:t>1/31/2017</a:t>
             </a:fld>
             <a:endParaRPr lang="en-US"/>
           </a:p>
@@ -1615,7 +1615,7 @@
           <a:p>
             <a:fld id="{7687D076-075A-4CBA-87EE-CF54B5B44D0B}" type="datetimeFigureOut">
               <a:rPr lang="en-US" smtClean="0"/>
-              <a:t>12/14/2016</a:t>
+              <a:t>1/31/2017</a:t>
             </a:fld>
             <a:endParaRPr lang="en-US"/>
           </a:p>
@@ -1733,7 +1733,7 @@
           <a:p>
             <a:fld id="{7687D076-075A-4CBA-87EE-CF54B5B44D0B}" type="datetimeFigureOut">
               <a:rPr lang="en-US" smtClean="0"/>
-              <a:t>12/14/2016</a:t>
+              <a:t>1/31/2017</a:t>
             </a:fld>
             <a:endParaRPr lang="en-US"/>
           </a:p>
@@ -1828,7 +1828,7 @@
           <a:p>
             <a:fld id="{7687D076-075A-4CBA-87EE-CF54B5B44D0B}" type="datetimeFigureOut">
               <a:rPr lang="en-US" smtClean="0"/>
-              <a:t>12/14/2016</a:t>
+              <a:t>1/31/2017</a:t>
             </a:fld>
             <a:endParaRPr lang="en-US"/>
           </a:p>
@@ -2105,7 +2105,7 @@
           <a:p>
             <a:fld id="{7687D076-075A-4CBA-87EE-CF54B5B44D0B}" type="datetimeFigureOut">
               <a:rPr lang="en-US" smtClean="0"/>
-              <a:t>12/14/2016</a:t>
+              <a:t>1/31/2017</a:t>
             </a:fld>
             <a:endParaRPr lang="en-US"/>
           </a:p>
@@ -2358,7 +2358,7 @@
           <a:p>
             <a:fld id="{7687D076-075A-4CBA-87EE-CF54B5B44D0B}" type="datetimeFigureOut">
               <a:rPr lang="en-US" smtClean="0"/>
-              <a:t>12/14/2016</a:t>
+              <a:t>1/31/2017</a:t>
             </a:fld>
             <a:endParaRPr lang="en-US"/>
           </a:p>
@@ -2571,7 +2571,7 @@
           <a:p>
             <a:fld id="{7687D076-075A-4CBA-87EE-CF54B5B44D0B}" type="datetimeFigureOut">
               <a:rPr lang="en-US" smtClean="0"/>
-              <a:t>12/14/2016</a:t>
+              <a:t>1/31/2017</a:t>
             </a:fld>
             <a:endParaRPr lang="en-US"/>
           </a:p>
@@ -3836,6 +3836,10 @@
               <a:buNone/>
             </a:pPr>
             <a:r>
+              <a:rPr lang="en-US" sz="1100" dirty="0" smtClean="0"/>
+              <a:t>D) </a:t>
+            </a:r>
+            <a:r>
               <a:rPr lang="en-US" sz="1100" dirty="0" err="1" smtClean="0"/>
               <a:t>subModels</a:t>
             </a:r>
@@ -4188,11 +4192,7 @@
             </a:pPr>
             <a:r>
               <a:rPr lang="en-US" sz="1100" dirty="0" smtClean="0"/>
-              <a:t>C) Set </a:t>
-            </a:r>
-            <a:r>
-              <a:rPr lang="en-US" sz="1100" dirty="0" smtClean="0"/>
-              <a:t>parsimonious to true in main, and </a:t>
+              <a:t>C) Set parsimonious to true in main, and </a:t>
             </a:r>
             <a:r>
               <a:rPr lang="en-US" sz="1100" dirty="0" err="1" smtClean="0"/>
@@ -4274,11 +4274,7 @@
             </a:pPr>
             <a:r>
               <a:rPr lang="en-US" sz="1600" dirty="0" smtClean="0"/>
-              <a:t>Table </a:t>
-            </a:r>
-            <a:r>
-              <a:rPr lang="en-US" sz="1600" dirty="0" smtClean="0"/>
-              <a:t>S1</a:t>
+              <a:t>Table S1</a:t>
             </a:r>
             <a:endParaRPr lang="en-US" sz="1600" dirty="0"/>
           </a:p>
@@ -11235,15 +11231,7 @@
             <a:pPr algn="ctr"/>
             <a:r>
               <a:rPr lang="en-US" sz="800" dirty="0" smtClean="0"/>
-              <a:t>g/[</a:t>
-            </a:r>
-            <a:r>
-              <a:rPr lang="en-US" sz="800" dirty="0" smtClean="0"/>
-              <a:t>g </a:t>
-            </a:r>
-            <a:r>
-              <a:rPr lang="en-US" sz="800" dirty="0" smtClean="0"/>
-              <a:t>biomass]=f(day)</a:t>
+              <a:t>g/[g biomass]=f(day)</a:t>
             </a:r>
             <a:endParaRPr lang="en-US" sz="1100" dirty="0"/>
           </a:p>

</xml_diff>